<commit_message>
Update Pulse Width Modulation - PWM.pptx
</commit_message>
<xml_diff>
--- a/Session_II/Presentation/Pulse Width Modulation - PWM.pptx
+++ b/Session_II/Presentation/Pulse Width Modulation - PWM.pptx
@@ -110,6 +110,11 @@
       </a:defRPr>
     </a:lvl9pPr>
   </p:defaultTextStyle>
+  <p:extLst>
+    <p:ext uri="{EFAFB233-063F-42B5-8137-9DF3F51BA10A}">
+      <p15:sldGuideLst xmlns:p15="http://schemas.microsoft.com/office/powerpoint/2012/main"/>
+    </p:ext>
+  </p:extLst>
 </p:presentation>
 </file>
 
@@ -4194,8 +4199,8 @@
         </p:nvSpPr>
         <p:spPr>
           <a:xfrm>
-            <a:off x="6096001" y="2002971"/>
-            <a:ext cx="5582194" cy="2585323"/>
+            <a:off x="6096001" y="2002970"/>
+            <a:ext cx="5088466" cy="2862322"/>
           </a:xfrm>
           <a:prstGeom prst="rect">
             <a:avLst/>
@@ -4243,7 +4248,7 @@
           <a:p>
             <a:r>
               <a:rPr lang="en-US" dirty="0"/>
-              <a:t>On Board LED Pings. PF1 = Red, PF2 = Green, PF3 = Blue</a:t>
+              <a:t>On Board LED Pings. PF1 = Red, PF2 = Blue, PF3 = Green</a:t>
             </a:r>
           </a:p>
           <a:p>

</xml_diff>